<commit_message>
Add 30 day prediction
</commit_message>
<xml_diff>
--- a/slide.pptx
+++ b/slide.pptx
@@ -4209,8 +4209,8 @@
           </a:p>
         </p:txBody>
       </p:sp>
-      <mc:AlternateContent xmlns:mc="http://schemas.openxmlformats.org/markup-compatibility/2006">
-        <mc:Choice xmlns:a14="http://schemas.microsoft.com/office/drawing/2010/main" Requires="a14">
+      <mc:AlternateContent xmlns:mc="http://schemas.openxmlformats.org/markup-compatibility/2006" xmlns:a14="http://schemas.microsoft.com/office/drawing/2010/main">
+        <mc:Choice Requires="a14">
           <p:sp>
             <p:nvSpPr>
               <p:cNvPr id="14" name="TextBox 13"/>
@@ -4325,19 +4325,7 @@
                             <a:rPr lang="en-US" b="0" i="1" smtClean="0">
                               <a:latin typeface="Cambria Math" panose="02040503050406030204" pitchFamily="18" charset="0"/>
                             </a:rPr>
-                            <m:t>&lt;0.</m:t>
-                          </m:r>
-                          <m:r>
-                            <a:rPr lang="en-US" b="0" i="1" smtClean="0">
-                              <a:latin typeface="Cambria Math" panose="02040503050406030204" pitchFamily="18" charset="0"/>
-                            </a:rPr>
-                            <m:t>01</m:t>
-                          </m:r>
-                          <m:r>
-                            <a:rPr lang="en-US" b="0" i="1" smtClean="0">
-                              <a:latin typeface="Cambria Math" panose="02040503050406030204" pitchFamily="18" charset="0"/>
-                            </a:rPr>
-                            <m:t>])</m:t>
+                            <m:t>&lt;0.01])</m:t>
                           </m:r>
                         </m:num>
                         <m:den>
@@ -4387,7 +4375,7 @@
             </p:txBody>
           </p:sp>
         </mc:Choice>
-        <mc:Fallback>
+        <mc:Fallback xmlns="">
           <p:sp>
             <p:nvSpPr>
               <p:cNvPr id="14" name="TextBox 13"/>
@@ -4502,15 +4490,7 @@
                 <a:ea typeface="Cambria Math" panose="02040503050406030204" pitchFamily="18" charset="0"/>
                 <a:cs typeface="Arial" panose="020B0604020202020204" pitchFamily="34" charset="0"/>
               </a:rPr>
-              <a:t>58</a:t>
-            </a:r>
-            <a:r>
-              <a:rPr lang="en-US" sz="3200" b="1" dirty="0" smtClean="0">
-                <a:latin typeface="Cambria Math" panose="02040503050406030204" pitchFamily="18" charset="0"/>
-                <a:ea typeface="Cambria Math" panose="02040503050406030204" pitchFamily="18" charset="0"/>
-                <a:cs typeface="Arial" panose="020B0604020202020204" pitchFamily="34" charset="0"/>
-              </a:rPr>
-              <a:t>,42%</a:t>
+              <a:t>58,42%</a:t>
             </a:r>
             <a:endParaRPr lang="en-US" sz="3200" b="1" dirty="0">
               <a:latin typeface="Cambria Math" panose="02040503050406030204" pitchFamily="18" charset="0"/>
@@ -5842,10 +5822,10 @@
                 <a:ea typeface="Tahoma"/>
                 <a:cs typeface="Tahoma"/>
               </a:rPr>
-              <a:t> (Gold ETF) </a:t>
-            </a:r>
-            <a:r>
-              <a:rPr lang="en-US" sz="2400" dirty="0" smtClean="0">
+              <a:t> (Gold ETF) 29 </a:t>
+            </a:r>
+            <a:r>
+              <a:rPr lang="en-US" sz="2400" dirty="0" err="1" smtClean="0">
                 <a:solidFill>
                   <a:schemeClr val="accent5">
                     <a:lumMod val="50000"/>
@@ -5855,10 +5835,10 @@
                 <a:ea typeface="Tahoma"/>
                 <a:cs typeface="Tahoma"/>
               </a:rPr>
-              <a:t>29 </a:t>
-            </a:r>
-            <a:r>
-              <a:rPr lang="en-US" sz="2400" dirty="0" err="1" smtClean="0">
+              <a:t>ngày</a:t>
+            </a:r>
+            <a:r>
+              <a:rPr lang="en-US" sz="2400" dirty="0" smtClean="0">
                 <a:solidFill>
                   <a:schemeClr val="accent5">
                     <a:lumMod val="50000"/>
@@ -5868,10 +5848,10 @@
                 <a:ea typeface="Tahoma"/>
                 <a:cs typeface="Tahoma"/>
               </a:rPr>
-              <a:t>ngày</a:t>
-            </a:r>
-            <a:r>
-              <a:rPr lang="en-US" sz="2400" dirty="0" smtClean="0">
+              <a:t> </a:t>
+            </a:r>
+            <a:r>
+              <a:rPr lang="en-US" sz="2400" dirty="0" err="1" smtClean="0">
                 <a:solidFill>
                   <a:schemeClr val="accent5">
                     <a:lumMod val="50000"/>
@@ -5881,10 +5861,10 @@
                 <a:ea typeface="Tahoma"/>
                 <a:cs typeface="Tahoma"/>
               </a:rPr>
-              <a:t> </a:t>
-            </a:r>
-            <a:r>
-              <a:rPr lang="en-US" sz="2400" dirty="0" err="1" smtClean="0">
+              <a:t>gần</a:t>
+            </a:r>
+            <a:r>
+              <a:rPr lang="en-US" sz="2400" dirty="0" smtClean="0">
                 <a:solidFill>
                   <a:schemeClr val="accent5">
                     <a:lumMod val="50000"/>
@@ -5894,10 +5874,10 @@
                 <a:ea typeface="Tahoma"/>
                 <a:cs typeface="Tahoma"/>
               </a:rPr>
-              <a:t>gần</a:t>
-            </a:r>
-            <a:r>
-              <a:rPr lang="en-US" sz="2400" dirty="0" smtClean="0">
+              <a:t> </a:t>
+            </a:r>
+            <a:r>
+              <a:rPr lang="en-US" sz="2400" dirty="0" err="1" smtClean="0">
                 <a:solidFill>
                   <a:schemeClr val="accent5">
                     <a:lumMod val="50000"/>
@@ -5907,10 +5887,10 @@
                 <a:ea typeface="Tahoma"/>
                 <a:cs typeface="Tahoma"/>
               </a:rPr>
-              <a:t> </a:t>
-            </a:r>
-            <a:r>
-              <a:rPr lang="en-US" sz="2400" dirty="0" err="1" smtClean="0">
+              <a:t>đây</a:t>
+            </a:r>
+            <a:r>
+              <a:rPr lang="en-US" sz="2400" dirty="0" smtClean="0">
                 <a:solidFill>
                   <a:schemeClr val="accent5">
                     <a:lumMod val="50000"/>
@@ -5920,10 +5900,10 @@
                 <a:ea typeface="Tahoma"/>
                 <a:cs typeface="Tahoma"/>
               </a:rPr>
-              <a:t>đây</a:t>
-            </a:r>
-            <a:r>
-              <a:rPr lang="en-US" sz="2400" dirty="0" smtClean="0">
+              <a:t>, </a:t>
+            </a:r>
+            <a:r>
+              <a:rPr lang="en-US" sz="2400" dirty="0">
                 <a:solidFill>
                   <a:schemeClr val="accent5">
                     <a:lumMod val="50000"/>
@@ -5933,10 +5913,10 @@
                 <a:ea typeface="Tahoma"/>
                 <a:cs typeface="Tahoma"/>
               </a:rPr>
-              <a:t>, </a:t>
-            </a:r>
-            <a:r>
-              <a:rPr lang="en-US" sz="2400" dirty="0">
+              <a:t>l</a:t>
+            </a:r>
+            <a:r>
+              <a:rPr lang="vi-VN" sz="2400" dirty="0" smtClean="0">
                 <a:solidFill>
                   <a:schemeClr val="accent5">
                     <a:lumMod val="50000"/>
@@ -5946,33 +5926,7 @@
                 <a:ea typeface="Tahoma"/>
                 <a:cs typeface="Tahoma"/>
               </a:rPr>
-              <a:t>l</a:t>
-            </a:r>
-            <a:r>
-              <a:rPr lang="vi-VN" sz="2400" dirty="0" smtClean="0">
-                <a:solidFill>
-                  <a:schemeClr val="accent5">
-                    <a:lumMod val="50000"/>
-                  </a:schemeClr>
-                </a:solidFill>
-                <a:latin typeface="Tahoma"/>
-                <a:ea typeface="Tahoma"/>
-                <a:cs typeface="Tahoma"/>
-              </a:rPr>
-              <a:t>àm sao dự đoán được giá </a:t>
-            </a:r>
-            <a:r>
-              <a:rPr lang="vi-VN" sz="2400" dirty="0" smtClean="0">
-                <a:solidFill>
-                  <a:schemeClr val="accent5">
-                    <a:lumMod val="50000"/>
-                  </a:schemeClr>
-                </a:solidFill>
-                <a:latin typeface="Tahoma"/>
-                <a:ea typeface="Tahoma"/>
-                <a:cs typeface="Tahoma"/>
-              </a:rPr>
-              <a:t>vàng</a:t>
+              <a:t>àm sao dự đoán được giá vàng</a:t>
             </a:r>
             <a:r>
               <a:rPr lang="en-US" sz="2400" dirty="0" smtClean="0">

</xml_diff>